<commit_message>
Screeplot and Correlation in poster
</commit_message>
<xml_diff>
--- a/Poster/Poster_draft.pptx
+++ b/Poster/Poster_draft.pptx
@@ -104,6 +104,11 @@
       </a:defRPr>
     </a:lvl9pPr>
   </p:defaultTextStyle>
+  <p:extLst>
+    <p:ext uri="{EFAFB233-063F-42B5-8137-9DF3F51BA10A}">
+      <p15:sldGuideLst xmlns:p15="http://schemas.microsoft.com/office/powerpoint/2012/main"/>
+    </p:ext>
+  </p:extLst>
 </p:presentation>
 </file>
 
@@ -238,7 +243,7 @@
           <a:p>
             <a:fld id="{2576B1A5-D934-8644-A761-37C2689B63B8}" type="datetimeFigureOut">
               <a:rPr lang="pt-PT" smtClean="0"/>
-              <a:t>16/01/20</a:t>
+              <a:t>16/01/2020</a:t>
             </a:fld>
             <a:endParaRPr lang="pt-PT"/>
           </a:p>
@@ -280,7 +285,7 @@
           <a:p>
             <a:fld id="{AD2FFA5E-E161-4D4A-90FF-37A3880A57B7}" type="slidenum">
               <a:rPr lang="pt-PT" smtClean="0"/>
-              <a:t>‹nº›</a:t>
+              <a:t>‹#›</a:t>
             </a:fld>
             <a:endParaRPr lang="pt-PT"/>
           </a:p>
@@ -408,7 +413,7 @@
           <a:p>
             <a:fld id="{2576B1A5-D934-8644-A761-37C2689B63B8}" type="datetimeFigureOut">
               <a:rPr lang="pt-PT" smtClean="0"/>
-              <a:t>16/01/20</a:t>
+              <a:t>16/01/2020</a:t>
             </a:fld>
             <a:endParaRPr lang="pt-PT"/>
           </a:p>
@@ -450,7 +455,7 @@
           <a:p>
             <a:fld id="{AD2FFA5E-E161-4D4A-90FF-37A3880A57B7}" type="slidenum">
               <a:rPr lang="pt-PT" smtClean="0"/>
-              <a:t>‹nº›</a:t>
+              <a:t>‹#›</a:t>
             </a:fld>
             <a:endParaRPr lang="pt-PT"/>
           </a:p>
@@ -588,7 +593,7 @@
           <a:p>
             <a:fld id="{2576B1A5-D934-8644-A761-37C2689B63B8}" type="datetimeFigureOut">
               <a:rPr lang="pt-PT" smtClean="0"/>
-              <a:t>16/01/20</a:t>
+              <a:t>16/01/2020</a:t>
             </a:fld>
             <a:endParaRPr lang="pt-PT"/>
           </a:p>
@@ -630,7 +635,7 @@
           <a:p>
             <a:fld id="{AD2FFA5E-E161-4D4A-90FF-37A3880A57B7}" type="slidenum">
               <a:rPr lang="pt-PT" smtClean="0"/>
-              <a:t>‹nº›</a:t>
+              <a:t>‹#›</a:t>
             </a:fld>
             <a:endParaRPr lang="pt-PT"/>
           </a:p>
@@ -758,7 +763,7 @@
           <a:p>
             <a:fld id="{2576B1A5-D934-8644-A761-37C2689B63B8}" type="datetimeFigureOut">
               <a:rPr lang="pt-PT" smtClean="0"/>
-              <a:t>16/01/20</a:t>
+              <a:t>16/01/2020</a:t>
             </a:fld>
             <a:endParaRPr lang="pt-PT"/>
           </a:p>
@@ -800,7 +805,7 @@
           <a:p>
             <a:fld id="{AD2FFA5E-E161-4D4A-90FF-37A3880A57B7}" type="slidenum">
               <a:rPr lang="pt-PT" smtClean="0"/>
-              <a:t>‹nº›</a:t>
+              <a:t>‹#›</a:t>
             </a:fld>
             <a:endParaRPr lang="pt-PT"/>
           </a:p>
@@ -1002,7 +1007,7 @@
           <a:p>
             <a:fld id="{2576B1A5-D934-8644-A761-37C2689B63B8}" type="datetimeFigureOut">
               <a:rPr lang="pt-PT" smtClean="0"/>
-              <a:t>16/01/20</a:t>
+              <a:t>16/01/2020</a:t>
             </a:fld>
             <a:endParaRPr lang="pt-PT"/>
           </a:p>
@@ -1044,7 +1049,7 @@
           <a:p>
             <a:fld id="{AD2FFA5E-E161-4D4A-90FF-37A3880A57B7}" type="slidenum">
               <a:rPr lang="pt-PT" smtClean="0"/>
-              <a:t>‹nº›</a:t>
+              <a:t>‹#›</a:t>
             </a:fld>
             <a:endParaRPr lang="pt-PT"/>
           </a:p>
@@ -1234,7 +1239,7 @@
           <a:p>
             <a:fld id="{2576B1A5-D934-8644-A761-37C2689B63B8}" type="datetimeFigureOut">
               <a:rPr lang="pt-PT" smtClean="0"/>
-              <a:t>16/01/20</a:t>
+              <a:t>16/01/2020</a:t>
             </a:fld>
             <a:endParaRPr lang="pt-PT"/>
           </a:p>
@@ -1276,7 +1281,7 @@
           <a:p>
             <a:fld id="{AD2FFA5E-E161-4D4A-90FF-37A3880A57B7}" type="slidenum">
               <a:rPr lang="pt-PT" smtClean="0"/>
-              <a:t>‹nº›</a:t>
+              <a:t>‹#›</a:t>
             </a:fld>
             <a:endParaRPr lang="pt-PT"/>
           </a:p>
@@ -1601,7 +1606,7 @@
           <a:p>
             <a:fld id="{2576B1A5-D934-8644-A761-37C2689B63B8}" type="datetimeFigureOut">
               <a:rPr lang="pt-PT" smtClean="0"/>
-              <a:t>16/01/20</a:t>
+              <a:t>16/01/2020</a:t>
             </a:fld>
             <a:endParaRPr lang="pt-PT"/>
           </a:p>
@@ -1643,7 +1648,7 @@
           <a:p>
             <a:fld id="{AD2FFA5E-E161-4D4A-90FF-37A3880A57B7}" type="slidenum">
               <a:rPr lang="pt-PT" smtClean="0"/>
-              <a:t>‹nº›</a:t>
+              <a:t>‹#›</a:t>
             </a:fld>
             <a:endParaRPr lang="pt-PT"/>
           </a:p>
@@ -1719,7 +1724,7 @@
           <a:p>
             <a:fld id="{2576B1A5-D934-8644-A761-37C2689B63B8}" type="datetimeFigureOut">
               <a:rPr lang="pt-PT" smtClean="0"/>
-              <a:t>16/01/20</a:t>
+              <a:t>16/01/2020</a:t>
             </a:fld>
             <a:endParaRPr lang="pt-PT"/>
           </a:p>
@@ -1761,7 +1766,7 @@
           <a:p>
             <a:fld id="{AD2FFA5E-E161-4D4A-90FF-37A3880A57B7}" type="slidenum">
               <a:rPr lang="pt-PT" smtClean="0"/>
-              <a:t>‹nº›</a:t>
+              <a:t>‹#›</a:t>
             </a:fld>
             <a:endParaRPr lang="pt-PT"/>
           </a:p>
@@ -1814,7 +1819,7 @@
           <a:p>
             <a:fld id="{2576B1A5-D934-8644-A761-37C2689B63B8}" type="datetimeFigureOut">
               <a:rPr lang="pt-PT" smtClean="0"/>
-              <a:t>16/01/20</a:t>
+              <a:t>16/01/2020</a:t>
             </a:fld>
             <a:endParaRPr lang="pt-PT"/>
           </a:p>
@@ -1856,7 +1861,7 @@
           <a:p>
             <a:fld id="{AD2FFA5E-E161-4D4A-90FF-37A3880A57B7}" type="slidenum">
               <a:rPr lang="pt-PT" smtClean="0"/>
-              <a:t>‹nº›</a:t>
+              <a:t>‹#›</a:t>
             </a:fld>
             <a:endParaRPr lang="pt-PT"/>
           </a:p>
@@ -2091,7 +2096,7 @@
           <a:p>
             <a:fld id="{2576B1A5-D934-8644-A761-37C2689B63B8}" type="datetimeFigureOut">
               <a:rPr lang="pt-PT" smtClean="0"/>
-              <a:t>16/01/20</a:t>
+              <a:t>16/01/2020</a:t>
             </a:fld>
             <a:endParaRPr lang="pt-PT"/>
           </a:p>
@@ -2133,7 +2138,7 @@
           <a:p>
             <a:fld id="{AD2FFA5E-E161-4D4A-90FF-37A3880A57B7}" type="slidenum">
               <a:rPr lang="pt-PT" smtClean="0"/>
-              <a:t>‹nº›</a:t>
+              <a:t>‹#›</a:t>
             </a:fld>
             <a:endParaRPr lang="pt-PT"/>
           </a:p>
@@ -2348,7 +2353,7 @@
           <a:p>
             <a:fld id="{2576B1A5-D934-8644-A761-37C2689B63B8}" type="datetimeFigureOut">
               <a:rPr lang="pt-PT" smtClean="0"/>
-              <a:t>16/01/20</a:t>
+              <a:t>16/01/2020</a:t>
             </a:fld>
             <a:endParaRPr lang="pt-PT"/>
           </a:p>
@@ -2390,7 +2395,7 @@
           <a:p>
             <a:fld id="{AD2FFA5E-E161-4D4A-90FF-37A3880A57B7}" type="slidenum">
               <a:rPr lang="pt-PT" smtClean="0"/>
-              <a:t>‹nº›</a:t>
+              <a:t>‹#›</a:t>
             </a:fld>
             <a:endParaRPr lang="pt-PT"/>
           </a:p>
@@ -2561,7 +2566,7 @@
           <a:p>
             <a:fld id="{2576B1A5-D934-8644-A761-37C2689B63B8}" type="datetimeFigureOut">
               <a:rPr lang="pt-PT" smtClean="0"/>
-              <a:t>16/01/20</a:t>
+              <a:t>16/01/2020</a:t>
             </a:fld>
             <a:endParaRPr lang="pt-PT"/>
           </a:p>
@@ -2639,7 +2644,7 @@
           <a:p>
             <a:fld id="{AD2FFA5E-E161-4D4A-90FF-37A3880A57B7}" type="slidenum">
               <a:rPr lang="pt-PT" smtClean="0"/>
-              <a:t>‹nº›</a:t>
+              <a:t>‹#›</a:t>
             </a:fld>
             <a:endParaRPr lang="pt-PT"/>
           </a:p>
@@ -4873,6 +4878,66 @@
           </a:p>
         </p:txBody>
       </p:sp>
+      <p:pic>
+        <p:nvPicPr>
+          <p:cNvPr id="15" name="Picture 14">
+            <a:extLst>
+              <a:ext uri="{FF2B5EF4-FFF2-40B4-BE49-F238E27FC236}">
+                <a16:creationId xmlns:a16="http://schemas.microsoft.com/office/drawing/2014/main" id="{75BECA44-47FB-45EC-9494-9C468A5D8683}"/>
+              </a:ext>
+            </a:extLst>
+          </p:cNvPr>
+          <p:cNvPicPr>
+            <a:picLocks noChangeAspect="1"/>
+          </p:cNvPicPr>
+          <p:nvPr/>
+        </p:nvPicPr>
+        <p:blipFill>
+          <a:blip r:embed="rId10"/>
+          <a:stretch>
+            <a:fillRect/>
+          </a:stretch>
+        </p:blipFill>
+        <p:spPr>
+          <a:xfrm>
+            <a:off x="14616857" y="1745455"/>
+            <a:ext cx="5270373" cy="3506518"/>
+          </a:xfrm>
+          <a:prstGeom prst="rect">
+            <a:avLst/>
+          </a:prstGeom>
+        </p:spPr>
+      </p:pic>
+      <p:pic>
+        <p:nvPicPr>
+          <p:cNvPr id="17" name="Picture 16">
+            <a:extLst>
+              <a:ext uri="{FF2B5EF4-FFF2-40B4-BE49-F238E27FC236}">
+                <a16:creationId xmlns:a16="http://schemas.microsoft.com/office/drawing/2014/main" id="{8696D2F9-F7F2-44D2-A9B9-4574FBFE83FF}"/>
+              </a:ext>
+            </a:extLst>
+          </p:cNvPr>
+          <p:cNvPicPr>
+            <a:picLocks noChangeAspect="1"/>
+          </p:cNvPicPr>
+          <p:nvPr/>
+        </p:nvPicPr>
+        <p:blipFill>
+          <a:blip r:embed="rId11"/>
+          <a:stretch>
+            <a:fillRect/>
+          </a:stretch>
+        </p:blipFill>
+        <p:spPr>
+          <a:xfrm>
+            <a:off x="771629" y="9095998"/>
+            <a:ext cx="5852172" cy="4334265"/>
+          </a:xfrm>
+          <a:prstGeom prst="rect">
+            <a:avLst/>
+          </a:prstGeom>
+        </p:spPr>
+      </p:pic>
     </p:spTree>
     <p:extLst>
       <p:ext uri="{BB962C8B-B14F-4D97-AF65-F5344CB8AC3E}">

</xml_diff>

<commit_message>
Changes Poster and Loadings Table
</commit_message>
<xml_diff>
--- a/Poster/Poster_draft.pptx
+++ b/Poster/Poster_draft.pptx
@@ -243,7 +243,7 @@
           <a:p>
             <a:fld id="{2576B1A5-D934-8644-A761-37C2689B63B8}" type="datetimeFigureOut">
               <a:rPr lang="pt-PT" smtClean="0"/>
-              <a:t>16/01/2020</a:t>
+              <a:t>17/01/2020</a:t>
             </a:fld>
             <a:endParaRPr lang="pt-PT"/>
           </a:p>
@@ -413,7 +413,7 @@
           <a:p>
             <a:fld id="{2576B1A5-D934-8644-A761-37C2689B63B8}" type="datetimeFigureOut">
               <a:rPr lang="pt-PT" smtClean="0"/>
-              <a:t>16/01/2020</a:t>
+              <a:t>17/01/2020</a:t>
             </a:fld>
             <a:endParaRPr lang="pt-PT"/>
           </a:p>
@@ -593,7 +593,7 @@
           <a:p>
             <a:fld id="{2576B1A5-D934-8644-A761-37C2689B63B8}" type="datetimeFigureOut">
               <a:rPr lang="pt-PT" smtClean="0"/>
-              <a:t>16/01/2020</a:t>
+              <a:t>17/01/2020</a:t>
             </a:fld>
             <a:endParaRPr lang="pt-PT"/>
           </a:p>
@@ -763,7 +763,7 @@
           <a:p>
             <a:fld id="{2576B1A5-D934-8644-A761-37C2689B63B8}" type="datetimeFigureOut">
               <a:rPr lang="pt-PT" smtClean="0"/>
-              <a:t>16/01/2020</a:t>
+              <a:t>17/01/2020</a:t>
             </a:fld>
             <a:endParaRPr lang="pt-PT"/>
           </a:p>
@@ -1007,7 +1007,7 @@
           <a:p>
             <a:fld id="{2576B1A5-D934-8644-A761-37C2689B63B8}" type="datetimeFigureOut">
               <a:rPr lang="pt-PT" smtClean="0"/>
-              <a:t>16/01/2020</a:t>
+              <a:t>17/01/2020</a:t>
             </a:fld>
             <a:endParaRPr lang="pt-PT"/>
           </a:p>
@@ -1239,7 +1239,7 @@
           <a:p>
             <a:fld id="{2576B1A5-D934-8644-A761-37C2689B63B8}" type="datetimeFigureOut">
               <a:rPr lang="pt-PT" smtClean="0"/>
-              <a:t>16/01/2020</a:t>
+              <a:t>17/01/2020</a:t>
             </a:fld>
             <a:endParaRPr lang="pt-PT"/>
           </a:p>
@@ -1606,7 +1606,7 @@
           <a:p>
             <a:fld id="{2576B1A5-D934-8644-A761-37C2689B63B8}" type="datetimeFigureOut">
               <a:rPr lang="pt-PT" smtClean="0"/>
-              <a:t>16/01/2020</a:t>
+              <a:t>17/01/2020</a:t>
             </a:fld>
             <a:endParaRPr lang="pt-PT"/>
           </a:p>
@@ -1724,7 +1724,7 @@
           <a:p>
             <a:fld id="{2576B1A5-D934-8644-A761-37C2689B63B8}" type="datetimeFigureOut">
               <a:rPr lang="pt-PT" smtClean="0"/>
-              <a:t>16/01/2020</a:t>
+              <a:t>17/01/2020</a:t>
             </a:fld>
             <a:endParaRPr lang="pt-PT"/>
           </a:p>
@@ -1819,7 +1819,7 @@
           <a:p>
             <a:fld id="{2576B1A5-D934-8644-A761-37C2689B63B8}" type="datetimeFigureOut">
               <a:rPr lang="pt-PT" smtClean="0"/>
-              <a:t>16/01/2020</a:t>
+              <a:t>17/01/2020</a:t>
             </a:fld>
             <a:endParaRPr lang="pt-PT"/>
           </a:p>
@@ -2096,7 +2096,7 @@
           <a:p>
             <a:fld id="{2576B1A5-D934-8644-A761-37C2689B63B8}" type="datetimeFigureOut">
               <a:rPr lang="pt-PT" smtClean="0"/>
-              <a:t>16/01/2020</a:t>
+              <a:t>17/01/2020</a:t>
             </a:fld>
             <a:endParaRPr lang="pt-PT"/>
           </a:p>
@@ -2353,7 +2353,7 @@
           <a:p>
             <a:fld id="{2576B1A5-D934-8644-A761-37C2689B63B8}" type="datetimeFigureOut">
               <a:rPr lang="pt-PT" smtClean="0"/>
-              <a:t>16/01/2020</a:t>
+              <a:t>17/01/2020</a:t>
             </a:fld>
             <a:endParaRPr lang="pt-PT"/>
           </a:p>
@@ -2566,7 +2566,7 @@
           <a:p>
             <a:fld id="{2576B1A5-D934-8644-A761-37C2689B63B8}" type="datetimeFigureOut">
               <a:rPr lang="pt-PT" smtClean="0"/>
-              <a:t>16/01/2020</a:t>
+              <a:t>17/01/2020</a:t>
             </a:fld>
             <a:endParaRPr lang="pt-PT"/>
           </a:p>
@@ -4271,7 +4271,7 @@
         <p:spPr>
           <a:xfrm>
             <a:off x="1607052" y="8547751"/>
-            <a:ext cx="3048048" cy="524398"/>
+            <a:ext cx="5040000" cy="524399"/>
           </a:xfrm>
           <a:prstGeom prst="roundRect">
             <a:avLst/>
@@ -4297,7 +4297,7 @@
                   <a:schemeClr val="bg1"/>
                 </a:solidFill>
               </a:rPr>
-              <a:t>Dimension Reduction</a:t>
+              <a:t>Principal Component Analysis (PCA)</a:t>
             </a:r>
           </a:p>
         </p:txBody>
@@ -4930,7 +4930,7 @@
         </p:blipFill>
         <p:spPr>
           <a:xfrm>
-            <a:off x="771629" y="9095998"/>
+            <a:off x="5203897" y="9194039"/>
             <a:ext cx="5852172" cy="4334265"/>
           </a:xfrm>
           <a:prstGeom prst="rect">
@@ -4938,6 +4938,475 @@
           </a:prstGeom>
         </p:spPr>
       </p:pic>
+      <p:pic>
+        <p:nvPicPr>
+          <p:cNvPr id="3" name="Picture 2">
+            <a:extLst>
+              <a:ext uri="{FF2B5EF4-FFF2-40B4-BE49-F238E27FC236}">
+                <a16:creationId xmlns:a16="http://schemas.microsoft.com/office/drawing/2014/main" id="{6C136060-DA6B-4476-A82B-423E048007AF}"/>
+              </a:ext>
+            </a:extLst>
+          </p:cNvPr>
+          <p:cNvPicPr>
+            <a:picLocks noChangeAspect="1"/>
+          </p:cNvPicPr>
+          <p:nvPr/>
+        </p:nvPicPr>
+        <p:blipFill>
+          <a:blip r:embed="rId12"/>
+          <a:stretch>
+            <a:fillRect/>
+          </a:stretch>
+        </p:blipFill>
+        <p:spPr>
+          <a:xfrm>
+            <a:off x="11215734" y="9644493"/>
+            <a:ext cx="3470956" cy="3518503"/>
+          </a:xfrm>
+          <a:prstGeom prst="rect">
+            <a:avLst/>
+          </a:prstGeom>
+        </p:spPr>
+      </p:pic>
+      <p:sp>
+        <p:nvSpPr>
+          <p:cNvPr id="4" name="Rectangle 3">
+            <a:extLst>
+              <a:ext uri="{FF2B5EF4-FFF2-40B4-BE49-F238E27FC236}">
+                <a16:creationId xmlns:a16="http://schemas.microsoft.com/office/drawing/2014/main" id="{154AB7A0-7EC0-4EDC-B040-259D9CBA3981}"/>
+              </a:ext>
+            </a:extLst>
+          </p:cNvPr>
+          <p:cNvSpPr/>
+          <p:nvPr/>
+        </p:nvSpPr>
+        <p:spPr>
+          <a:xfrm>
+            <a:off x="14811011" y="5614264"/>
+            <a:ext cx="2436818" cy="1624736"/>
+          </a:xfrm>
+          <a:prstGeom prst="rect">
+            <a:avLst/>
+          </a:prstGeom>
+          <a:noFill/>
+        </p:spPr>
+        <p:style>
+          <a:lnRef idx="2">
+            <a:schemeClr val="accent1">
+              <a:shade val="50000"/>
+            </a:schemeClr>
+          </a:lnRef>
+          <a:fillRef idx="1">
+            <a:schemeClr val="accent1"/>
+          </a:fillRef>
+          <a:effectRef idx="0">
+            <a:schemeClr val="accent1"/>
+          </a:effectRef>
+          <a:fontRef idx="minor">
+            <a:schemeClr val="lt1"/>
+          </a:fontRef>
+        </p:style>
+        <p:txBody>
+          <a:bodyPr rtlCol="0" anchor="ctr"/>
+          <a:lstStyle/>
+          <a:p>
+            <a:pPr algn="ctr"/>
+            <a:r>
+              <a:rPr lang="de-DE" dirty="0">
+                <a:solidFill>
+                  <a:schemeClr val="tx1"/>
+                </a:solidFill>
+              </a:rPr>
+              <a:t>QQ Plot not </a:t>
+            </a:r>
+            <a:r>
+              <a:rPr lang="de-DE" dirty="0" err="1">
+                <a:solidFill>
+                  <a:schemeClr val="tx1"/>
+                </a:solidFill>
+              </a:rPr>
+              <a:t>normalized</a:t>
+            </a:r>
+            <a:endParaRPr lang="en-GB" dirty="0">
+              <a:solidFill>
+                <a:schemeClr val="tx1"/>
+              </a:solidFill>
+            </a:endParaRPr>
+          </a:p>
+        </p:txBody>
+      </p:sp>
+      <p:sp>
+        <p:nvSpPr>
+          <p:cNvPr id="43" name="Rectangle 42">
+            <a:extLst>
+              <a:ext uri="{FF2B5EF4-FFF2-40B4-BE49-F238E27FC236}">
+                <a16:creationId xmlns:a16="http://schemas.microsoft.com/office/drawing/2014/main" id="{305BF8C5-5121-40A3-9273-DCAC00B7CC6B}"/>
+              </a:ext>
+            </a:extLst>
+          </p:cNvPr>
+          <p:cNvSpPr/>
+          <p:nvPr/>
+        </p:nvSpPr>
+        <p:spPr>
+          <a:xfrm>
+            <a:off x="17516643" y="5629769"/>
+            <a:ext cx="2436818" cy="1624736"/>
+          </a:xfrm>
+          <a:prstGeom prst="rect">
+            <a:avLst/>
+          </a:prstGeom>
+          <a:noFill/>
+        </p:spPr>
+        <p:style>
+          <a:lnRef idx="2">
+            <a:schemeClr val="accent1">
+              <a:shade val="50000"/>
+            </a:schemeClr>
+          </a:lnRef>
+          <a:fillRef idx="1">
+            <a:schemeClr val="accent1"/>
+          </a:fillRef>
+          <a:effectRef idx="0">
+            <a:schemeClr val="accent1"/>
+          </a:effectRef>
+          <a:fontRef idx="minor">
+            <a:schemeClr val="lt1"/>
+          </a:fontRef>
+        </p:style>
+        <p:txBody>
+          <a:bodyPr rtlCol="0" anchor="ctr"/>
+          <a:lstStyle/>
+          <a:p>
+            <a:pPr algn="ctr"/>
+            <a:r>
+              <a:rPr lang="de-DE" dirty="0">
+                <a:solidFill>
+                  <a:schemeClr val="tx1"/>
+                </a:solidFill>
+              </a:rPr>
+              <a:t>QQ Plot </a:t>
+            </a:r>
+            <a:r>
+              <a:rPr lang="de-DE" dirty="0" err="1">
+                <a:solidFill>
+                  <a:schemeClr val="tx1"/>
+                </a:solidFill>
+              </a:rPr>
+              <a:t>normalized</a:t>
+            </a:r>
+            <a:endParaRPr lang="en-GB" dirty="0">
+              <a:solidFill>
+                <a:schemeClr val="tx1"/>
+              </a:solidFill>
+            </a:endParaRPr>
+          </a:p>
+        </p:txBody>
+      </p:sp>
+      <p:sp>
+        <p:nvSpPr>
+          <p:cNvPr id="46" name="CaixaDeTexto 65">
+            <a:extLst>
+              <a:ext uri="{FF2B5EF4-FFF2-40B4-BE49-F238E27FC236}">
+                <a16:creationId xmlns:a16="http://schemas.microsoft.com/office/drawing/2014/main" id="{2E39482B-D460-4E29-96A3-CF1443D676E1}"/>
+              </a:ext>
+            </a:extLst>
+          </p:cNvPr>
+          <p:cNvSpPr txBox="1"/>
+          <p:nvPr/>
+        </p:nvSpPr>
+        <p:spPr>
+          <a:xfrm>
+            <a:off x="1140929" y="9769069"/>
+            <a:ext cx="3903303" cy="1592103"/>
+          </a:xfrm>
+          <a:prstGeom prst="rect">
+            <a:avLst/>
+          </a:prstGeom>
+          <a:noFill/>
+        </p:spPr>
+        <p:txBody>
+          <a:bodyPr wrap="square" rtlCol="0">
+            <a:spAutoFit/>
+          </a:bodyPr>
+          <a:lstStyle/>
+          <a:p>
+            <a:r>
+              <a:rPr lang="en-US" sz="1949" b="1" dirty="0"/>
+              <a:t>Objectives PCA</a:t>
+            </a:r>
+            <a:r>
+              <a:rPr lang="en-US" sz="1949" dirty="0"/>
+              <a:t>:</a:t>
+            </a:r>
+          </a:p>
+          <a:p>
+            <a:pPr marL="303739" indent="-303739">
+              <a:buFontTx/>
+              <a:buChar char="-"/>
+            </a:pPr>
+            <a:r>
+              <a:rPr lang="en-US" sz="1949" dirty="0"/>
+              <a:t>Analysis the ratings of the cereals</a:t>
+            </a:r>
+          </a:p>
+          <a:p>
+            <a:pPr marL="303739" indent="-303739">
+              <a:buFontTx/>
+              <a:buChar char="-"/>
+            </a:pPr>
+            <a:r>
+              <a:rPr lang="en-US" sz="1949" dirty="0"/>
+              <a:t>Analysis the similar of the cereals</a:t>
+            </a:r>
+          </a:p>
+          <a:p>
+            <a:pPr marL="303739" indent="-303739">
+              <a:buFontTx/>
+              <a:buChar char="-"/>
+            </a:pPr>
+            <a:r>
+              <a:rPr lang="en-US" sz="1949" dirty="0"/>
+              <a:t>Predict the ratings of new possible cereals</a:t>
+            </a:r>
+          </a:p>
+        </p:txBody>
+      </p:sp>
+      <p:sp>
+        <p:nvSpPr>
+          <p:cNvPr id="52" name="Rectangle 51">
+            <a:extLst>
+              <a:ext uri="{FF2B5EF4-FFF2-40B4-BE49-F238E27FC236}">
+                <a16:creationId xmlns:a16="http://schemas.microsoft.com/office/drawing/2014/main" id="{A7D0056B-859F-406D-A35E-BD4AD0768048}"/>
+              </a:ext>
+            </a:extLst>
+          </p:cNvPr>
+          <p:cNvSpPr/>
+          <p:nvPr/>
+        </p:nvSpPr>
+        <p:spPr>
+          <a:xfrm>
+            <a:off x="14811011" y="7359335"/>
+            <a:ext cx="5142450" cy="706366"/>
+          </a:xfrm>
+          <a:prstGeom prst="rect">
+            <a:avLst/>
+          </a:prstGeom>
+          <a:noFill/>
+        </p:spPr>
+        <p:style>
+          <a:lnRef idx="2">
+            <a:schemeClr val="accent1">
+              <a:shade val="50000"/>
+            </a:schemeClr>
+          </a:lnRef>
+          <a:fillRef idx="1">
+            <a:schemeClr val="accent1"/>
+          </a:fillRef>
+          <a:effectRef idx="0">
+            <a:schemeClr val="accent1"/>
+          </a:effectRef>
+          <a:fontRef idx="minor">
+            <a:schemeClr val="lt1"/>
+          </a:fontRef>
+        </p:style>
+        <p:txBody>
+          <a:bodyPr rtlCol="0" anchor="ctr"/>
+          <a:lstStyle/>
+          <a:p>
+            <a:pPr algn="ctr"/>
+            <a:r>
+              <a:rPr lang="de-DE" dirty="0">
+                <a:solidFill>
+                  <a:schemeClr val="tx1"/>
+                </a:solidFill>
+              </a:rPr>
+              <a:t>Short Interpretation QQ Plot </a:t>
+            </a:r>
+            <a:endParaRPr lang="en-GB" dirty="0">
+              <a:solidFill>
+                <a:schemeClr val="tx1"/>
+              </a:solidFill>
+            </a:endParaRPr>
+          </a:p>
+        </p:txBody>
+      </p:sp>
+      <p:sp>
+        <p:nvSpPr>
+          <p:cNvPr id="53" name="Rectangle 52">
+            <a:extLst>
+              <a:ext uri="{FF2B5EF4-FFF2-40B4-BE49-F238E27FC236}">
+                <a16:creationId xmlns:a16="http://schemas.microsoft.com/office/drawing/2014/main" id="{E1C7A973-4730-4F1A-A370-3A97F939A14D}"/>
+              </a:ext>
+            </a:extLst>
+          </p:cNvPr>
+          <p:cNvSpPr/>
+          <p:nvPr/>
+        </p:nvSpPr>
+        <p:spPr>
+          <a:xfrm>
+            <a:off x="15165638" y="9346362"/>
+            <a:ext cx="4740583" cy="2794838"/>
+          </a:xfrm>
+          <a:prstGeom prst="rect">
+            <a:avLst/>
+          </a:prstGeom>
+          <a:noFill/>
+        </p:spPr>
+        <p:style>
+          <a:lnRef idx="2">
+            <a:schemeClr val="accent1">
+              <a:shade val="50000"/>
+            </a:schemeClr>
+          </a:lnRef>
+          <a:fillRef idx="1">
+            <a:schemeClr val="accent1"/>
+          </a:fillRef>
+          <a:effectRef idx="0">
+            <a:schemeClr val="accent1"/>
+          </a:effectRef>
+          <a:fontRef idx="minor">
+            <a:schemeClr val="lt1"/>
+          </a:fontRef>
+        </p:style>
+        <p:txBody>
+          <a:bodyPr rtlCol="0" anchor="ctr"/>
+          <a:lstStyle/>
+          <a:p>
+            <a:pPr algn="ctr"/>
+            <a:r>
+              <a:rPr lang="de-DE" dirty="0">
+                <a:solidFill>
+                  <a:schemeClr val="tx1"/>
+                </a:solidFill>
+              </a:rPr>
+              <a:t>PCA DIM PLOT?</a:t>
+            </a:r>
+            <a:endParaRPr lang="en-GB" dirty="0">
+              <a:solidFill>
+                <a:schemeClr val="tx1"/>
+              </a:solidFill>
+            </a:endParaRPr>
+          </a:p>
+        </p:txBody>
+      </p:sp>
+      <p:sp>
+        <p:nvSpPr>
+          <p:cNvPr id="54" name="CaixaDeTexto 65">
+            <a:extLst>
+              <a:ext uri="{FF2B5EF4-FFF2-40B4-BE49-F238E27FC236}">
+                <a16:creationId xmlns:a16="http://schemas.microsoft.com/office/drawing/2014/main" id="{04F4A010-3179-410F-98E4-D92F55A33BAA}"/>
+              </a:ext>
+            </a:extLst>
+          </p:cNvPr>
+          <p:cNvSpPr txBox="1"/>
+          <p:nvPr/>
+        </p:nvSpPr>
+        <p:spPr>
+          <a:xfrm>
+            <a:off x="1140928" y="11692086"/>
+            <a:ext cx="3903303" cy="1592103"/>
+          </a:xfrm>
+          <a:prstGeom prst="rect">
+            <a:avLst/>
+          </a:prstGeom>
+          <a:noFill/>
+        </p:spPr>
+        <p:txBody>
+          <a:bodyPr wrap="square" rtlCol="0">
+            <a:spAutoFit/>
+          </a:bodyPr>
+          <a:lstStyle/>
+          <a:p>
+            <a:r>
+              <a:rPr lang="en-US" sz="1949" b="1" dirty="0"/>
+              <a:t>Interpretation Scree Plot</a:t>
+            </a:r>
+            <a:r>
+              <a:rPr lang="en-US" sz="1949" dirty="0"/>
+              <a:t>:</a:t>
+            </a:r>
+          </a:p>
+          <a:p>
+            <a:pPr marL="303739" indent="-303739">
+              <a:buFontTx/>
+              <a:buChar char="-"/>
+            </a:pPr>
+            <a:r>
+              <a:rPr lang="en-US" sz="1949" dirty="0"/>
+              <a:t>Analysis the ratings of the cereals</a:t>
+            </a:r>
+          </a:p>
+          <a:p>
+            <a:pPr marL="303739" indent="-303739">
+              <a:buFontTx/>
+              <a:buChar char="-"/>
+            </a:pPr>
+            <a:r>
+              <a:rPr lang="en-US" sz="1949" dirty="0"/>
+              <a:t>Analysis the similar of the cereals</a:t>
+            </a:r>
+          </a:p>
+          <a:p>
+            <a:pPr marL="303739" indent="-303739">
+              <a:buFontTx/>
+              <a:buChar char="-"/>
+            </a:pPr>
+            <a:r>
+              <a:rPr lang="en-US" sz="1949" dirty="0"/>
+              <a:t>Predict the ratings of new possible cereals</a:t>
+            </a:r>
+          </a:p>
+        </p:txBody>
+      </p:sp>
+      <p:sp>
+        <p:nvSpPr>
+          <p:cNvPr id="62" name="CaixaDeTexto 65">
+            <a:extLst>
+              <a:ext uri="{FF2B5EF4-FFF2-40B4-BE49-F238E27FC236}">
+                <a16:creationId xmlns:a16="http://schemas.microsoft.com/office/drawing/2014/main" id="{DC62551F-9F44-4B41-90F3-81B54DEE1DAC}"/>
+              </a:ext>
+            </a:extLst>
+          </p:cNvPr>
+          <p:cNvSpPr txBox="1"/>
+          <p:nvPr/>
+        </p:nvSpPr>
+        <p:spPr>
+          <a:xfrm>
+            <a:off x="15092998" y="12427112"/>
+            <a:ext cx="4860463" cy="692241"/>
+          </a:xfrm>
+          <a:prstGeom prst="rect">
+            <a:avLst/>
+          </a:prstGeom>
+          <a:noFill/>
+        </p:spPr>
+        <p:txBody>
+          <a:bodyPr wrap="square" rtlCol="0">
+            <a:spAutoFit/>
+          </a:bodyPr>
+          <a:lstStyle/>
+          <a:p>
+            <a:r>
+              <a:rPr lang="en-US" sz="1949" b="1" dirty="0"/>
+              <a:t>Conclusion PCA and further use</a:t>
+            </a:r>
+            <a:r>
+              <a:rPr lang="en-US" sz="1949" dirty="0"/>
+              <a:t>:</a:t>
+            </a:r>
+          </a:p>
+          <a:p>
+            <a:pPr marL="303739" indent="-303739">
+              <a:buFontTx/>
+              <a:buChar char="-"/>
+            </a:pPr>
+            <a:r>
+              <a:rPr lang="en-US" sz="1949" dirty="0"/>
+              <a:t>Analysis the ratings of the cereals</a:t>
+            </a:r>
+          </a:p>
+        </p:txBody>
+      </p:sp>
     </p:spTree>
     <p:extLst>
       <p:ext uri="{BB962C8B-B14F-4D97-AF65-F5344CB8AC3E}">

</xml_diff>

<commit_message>
Interpretation PCA in Poster
</commit_message>
<xml_diff>
--- a/Poster/Poster_draft.pptx
+++ b/Poster/Poster_draft.pptx
@@ -4930,7 +4930,7 @@
         </p:blipFill>
         <p:spPr>
           <a:xfrm>
-            <a:off x="5203897" y="9194039"/>
+            <a:off x="4953473" y="9194039"/>
             <a:ext cx="5852172" cy="4334265"/>
           </a:xfrm>
           <a:prstGeom prst="rect">
@@ -4960,8 +4960,8 @@
         </p:blipFill>
         <p:spPr>
           <a:xfrm>
-            <a:off x="11215734" y="9644493"/>
-            <a:ext cx="3470956" cy="3518503"/>
+            <a:off x="10559246" y="9570710"/>
+            <a:ext cx="3083926" cy="3518503"/>
           </a:xfrm>
           <a:prstGeom prst="rect">
             <a:avLst/>
@@ -5116,8 +5116,8 @@
         </p:nvSpPr>
         <p:spPr>
           <a:xfrm>
-            <a:off x="1140929" y="9769069"/>
-            <a:ext cx="3903303" cy="1592103"/>
+            <a:off x="1140930" y="9769069"/>
+            <a:ext cx="3812544" cy="4591642"/>
           </a:xfrm>
           <a:prstGeom prst="rect">
             <a:avLst/>
@@ -5146,7 +5146,7 @@
             </a:pPr>
             <a:r>
               <a:rPr lang="en-US" sz="1949" dirty="0"/>
-              <a:t>Analysis the ratings of the cereals</a:t>
+              <a:t>Reduce dimensions</a:t>
             </a:r>
           </a:p>
           <a:p>
@@ -5156,7 +5156,17 @@
             </a:pPr>
             <a:r>
               <a:rPr lang="en-US" sz="1949" dirty="0"/>
-              <a:t>Analysis the similar of the cereals</a:t>
+              <a:t>Help visualizing</a:t>
+            </a:r>
+          </a:p>
+          <a:p>
+            <a:r>
+              <a:rPr lang="en-US" sz="1949" b="1" dirty="0"/>
+              <a:t>Interpretation Scree Plot</a:t>
+            </a:r>
+            <a:r>
+              <a:rPr lang="en-US" sz="1949" dirty="0"/>
+              <a:t>:</a:t>
             </a:r>
           </a:p>
           <a:p>
@@ -5166,8 +5176,40 @@
             </a:pPr>
             <a:r>
               <a:rPr lang="en-US" sz="1949" dirty="0"/>
-              <a:t>Predict the ratings of new possible cereals</a:t>
-            </a:r>
+              <a:t>PC 1 explains 3X % of the variation</a:t>
+            </a:r>
+          </a:p>
+          <a:p>
+            <a:pPr marL="303739" indent="-303739">
+              <a:buFontTx/>
+              <a:buChar char="-"/>
+            </a:pPr>
+            <a:r>
+              <a:rPr lang="en-US" sz="1949" dirty="0"/>
+              <a:t>PC1 – PC4 explains 8X % of the variation which can be considered as adequate</a:t>
+            </a:r>
+          </a:p>
+          <a:p>
+            <a:r>
+              <a:rPr lang="en-US" sz="1949" b="1" dirty="0"/>
+              <a:t>Further use of PCA:</a:t>
+            </a:r>
+          </a:p>
+          <a:p>
+            <a:pPr marL="303739" indent="-303739">
+              <a:buFontTx/>
+              <a:buChar char="-"/>
+            </a:pPr>
+            <a:r>
+              <a:rPr lang="en-US" sz="1949" dirty="0"/>
+              <a:t>Computed PC’s can be used for the following clustering analysis or a linear regression</a:t>
+            </a:r>
+          </a:p>
+          <a:p>
+            <a:endParaRPr lang="en-US" sz="1949" dirty="0"/>
+          </a:p>
+          <a:p>
+            <a:endParaRPr lang="en-US" sz="1949" dirty="0"/>
           </a:p>
         </p:txBody>
       </p:sp>
@@ -5244,8 +5286,8 @@
         </p:nvSpPr>
         <p:spPr>
           <a:xfrm>
-            <a:off x="15165638" y="9346362"/>
-            <a:ext cx="4740583" cy="2794838"/>
+            <a:off x="20347991" y="9855223"/>
+            <a:ext cx="2658392" cy="2794838"/>
           </a:xfrm>
           <a:prstGeom prst="rect">
             <a:avLst/>
@@ -5291,10 +5333,10 @@
       </p:sp>
       <p:sp>
         <p:nvSpPr>
-          <p:cNvPr id="54" name="CaixaDeTexto 65">
+          <p:cNvPr id="49" name="CaixaDeTexto 65">
             <a:extLst>
               <a:ext uri="{FF2B5EF4-FFF2-40B4-BE49-F238E27FC236}">
-                <a16:creationId xmlns:a16="http://schemas.microsoft.com/office/drawing/2014/main" id="{04F4A010-3179-410F-98E4-D92F55A33BAA}"/>
+                <a16:creationId xmlns:a16="http://schemas.microsoft.com/office/drawing/2014/main" id="{A56CA361-781F-4897-815E-D969430EF2FB}"/>
               </a:ext>
             </a:extLst>
           </p:cNvPr>
@@ -5303,8 +5345,8 @@
         </p:nvSpPr>
         <p:spPr>
           <a:xfrm>
-            <a:off x="1140928" y="11692086"/>
-            <a:ext cx="3903303" cy="1592103"/>
+            <a:off x="13612536" y="9141102"/>
+            <a:ext cx="7107379" cy="3991734"/>
           </a:xfrm>
           <a:prstGeom prst="rect">
             <a:avLst/>
@@ -5319,7 +5361,7 @@
           <a:p>
             <a:r>
               <a:rPr lang="en-US" sz="1949" b="1" dirty="0"/>
-              <a:t>Interpretation Scree Plot</a:t>
+              <a:t>Conclusion PC</a:t>
             </a:r>
             <a:r>
               <a:rPr lang="en-US" sz="1949" dirty="0"/>
@@ -5333,7 +5375,11 @@
             </a:pPr>
             <a:r>
               <a:rPr lang="en-US" sz="1949" dirty="0"/>
-              <a:t>Analysis the ratings of the cereals</a:t>
+              <a:t>PC 1 (High Fat) is </a:t>
+            </a:r>
+            <a:r>
+              <a:rPr lang="en-GB" sz="1949" dirty="0"/>
+              <a:t>strongly positive correlated to fat, slightly to Protein and slightly negative correlated to calories, therefore the PC1 increases with increasing in fat and protein</a:t>
             </a:r>
           </a:p>
           <a:p>
@@ -5342,8 +5388,8 @@
               <a:buChar char="-"/>
             </a:pPr>
             <a:r>
-              <a:rPr lang="en-US" sz="1949" dirty="0"/>
-              <a:t>Analysis the similar of the cereals</a:t>
+              <a:rPr lang="en-GB" sz="1949" dirty="0"/>
+              <a:t>PC 2 (Protein Carbs) has no strong correlation to a specific variable, but relatively high correlation to calories, protein, fat and carbo (complex carbohydrates), therefore it increases with increasing in these variables and explains a mix of variables</a:t>
             </a:r>
           </a:p>
           <a:p>
@@ -5352,47 +5398,8 @@
               <a:buChar char="-"/>
             </a:pPr>
             <a:r>
-              <a:rPr lang="en-US" sz="1949" dirty="0"/>
-              <a:t>Predict the ratings of new possible cereals</a:t>
-            </a:r>
-          </a:p>
-        </p:txBody>
-      </p:sp>
-      <p:sp>
-        <p:nvSpPr>
-          <p:cNvPr id="62" name="CaixaDeTexto 65">
-            <a:extLst>
-              <a:ext uri="{FF2B5EF4-FFF2-40B4-BE49-F238E27FC236}">
-                <a16:creationId xmlns:a16="http://schemas.microsoft.com/office/drawing/2014/main" id="{DC62551F-9F44-4B41-90F3-81B54DEE1DAC}"/>
-              </a:ext>
-            </a:extLst>
-          </p:cNvPr>
-          <p:cNvSpPr txBox="1"/>
-          <p:nvPr/>
-        </p:nvSpPr>
-        <p:spPr>
-          <a:xfrm>
-            <a:off x="15092998" y="12427112"/>
-            <a:ext cx="4860463" cy="692241"/>
-          </a:xfrm>
-          <a:prstGeom prst="rect">
-            <a:avLst/>
-          </a:prstGeom>
-          <a:noFill/>
-        </p:spPr>
-        <p:txBody>
-          <a:bodyPr wrap="square" rtlCol="0">
-            <a:spAutoFit/>
-          </a:bodyPr>
-          <a:lstStyle/>
-          <a:p>
-            <a:r>
-              <a:rPr lang="en-US" sz="1949" b="1" dirty="0"/>
-              <a:t>Conclusion PCA and further use</a:t>
-            </a:r>
-            <a:r>
-              <a:rPr lang="en-US" sz="1949" dirty="0"/>
-              <a:t>:</a:t>
+              <a:rPr lang="en-GB" sz="1949" dirty="0"/>
+              <a:t>PC 3 (Protein Fat) behaves like PC 2 but with a negative correlation with calories</a:t>
             </a:r>
           </a:p>
           <a:p>
@@ -5401,9 +5408,10 @@
               <a:buChar char="-"/>
             </a:pPr>
             <a:r>
-              <a:rPr lang="en-US" sz="1949" dirty="0"/>
-              <a:t>Analysis the ratings of the cereals</a:t>
-            </a:r>
+              <a:rPr lang="en-GB" sz="1949" dirty="0"/>
+              <a:t>PC 4 has a strong negative correlation with sodium and is primarily a measure of sodium. This PC decreases with increasing in sodium</a:t>
+            </a:r>
+            <a:endParaRPr lang="en-US" sz="1949" dirty="0"/>
           </a:p>
         </p:txBody>
       </p:sp>

</xml_diff>